<commit_message>
Added files for Entrega 3
</commit_message>
<xml_diff>
--- a/Diagrama de casos de uso.pptx
+++ b/Diagrama de casos de uso.pptx
@@ -2985,6 +2985,72 @@
       </p:grpSpPr>
       <p:cxnSp>
         <p:nvCxnSpPr>
+          <p:cNvPr id="51" name="Conector recto 50"/>
+          <p:cNvCxnSpPr>
+            <a:endCxn id="50" idx="4"/>
+          </p:cNvCxnSpPr>
+          <p:nvPr/>
+        </p:nvCxnSpPr>
+        <p:spPr>
+          <a:xfrm flipH="1" flipV="1">
+            <a:off x="8645481" y="4581075"/>
+            <a:ext cx="23243" cy="926673"/>
+          </a:xfrm>
+          <a:prstGeom prst="line">
+            <a:avLst/>
+          </a:prstGeom>
+          <a:ln w="25400"/>
+        </p:spPr>
+        <p:style>
+          <a:lnRef idx="1">
+            <a:schemeClr val="accent1"/>
+          </a:lnRef>
+          <a:fillRef idx="0">
+            <a:schemeClr val="accent1"/>
+          </a:fillRef>
+          <a:effectRef idx="0">
+            <a:schemeClr val="accent1"/>
+          </a:effectRef>
+          <a:fontRef idx="minor">
+            <a:schemeClr val="tx1"/>
+          </a:fontRef>
+        </p:style>
+      </p:cxnSp>
+      <p:cxnSp>
+        <p:nvCxnSpPr>
+          <p:cNvPr id="47" name="Conector recto 46"/>
+          <p:cNvCxnSpPr>
+            <a:endCxn id="46" idx="5"/>
+          </p:cNvCxnSpPr>
+          <p:nvPr/>
+        </p:nvCxnSpPr>
+        <p:spPr>
+          <a:xfrm flipH="1" flipV="1">
+            <a:off x="8240263" y="1113896"/>
+            <a:ext cx="831915" cy="732984"/>
+          </a:xfrm>
+          <a:prstGeom prst="line">
+            <a:avLst/>
+          </a:prstGeom>
+          <a:ln w="25400"/>
+        </p:spPr>
+        <p:style>
+          <a:lnRef idx="1">
+            <a:schemeClr val="accent1"/>
+          </a:lnRef>
+          <a:fillRef idx="0">
+            <a:schemeClr val="accent1"/>
+          </a:fillRef>
+          <a:effectRef idx="0">
+            <a:schemeClr val="accent1"/>
+          </a:effectRef>
+          <a:fontRef idx="minor">
+            <a:schemeClr val="tx1"/>
+          </a:fontRef>
+        </p:style>
+      </p:cxnSp>
+      <p:cxnSp>
+        <p:nvCxnSpPr>
           <p:cNvPr id="45" name="Conector recto 44"/>
           <p:cNvCxnSpPr>
             <a:endCxn id="35" idx="2"/>
@@ -3085,15 +3151,13 @@
       <p:cxnSp>
         <p:nvCxnSpPr>
           <p:cNvPr id="32" name="Conector recto 31"/>
-          <p:cNvCxnSpPr>
-            <a:endCxn id="28" idx="2"/>
-          </p:cNvCxnSpPr>
+          <p:cNvCxnSpPr/>
           <p:nvPr/>
         </p:nvCxnSpPr>
         <p:spPr>
           <a:xfrm flipV="1">
-            <a:off x="8520600" y="2033470"/>
-            <a:ext cx="1372243" cy="171425"/>
+            <a:off x="9014390" y="1795096"/>
+            <a:ext cx="936843" cy="103569"/>
           </a:xfrm>
           <a:prstGeom prst="line">
             <a:avLst/>
@@ -3410,14 +3474,14 @@
         </p:nvSpPr>
         <p:spPr>
           <a:xfrm>
-            <a:off x="8655353" y="430333"/>
+            <a:off x="8713743" y="191958"/>
             <a:ext cx="2052949" cy="995871"/>
           </a:xfrm>
           <a:prstGeom prst="ellipse">
             <a:avLst/>
           </a:prstGeom>
           <a:solidFill>
-            <a:schemeClr val="accent2"/>
+            <a:schemeClr val="bg1"/>
           </a:solidFill>
         </p:spPr>
         <p:style>
@@ -3440,10 +3504,18 @@
           <a:p>
             <a:pPr algn="ctr"/>
             <a:r>
-              <a:rPr lang="es-AR" dirty="0" smtClean="0"/>
+              <a:rPr lang="es-AR" dirty="0" smtClean="0">
+                <a:solidFill>
+                  <a:schemeClr val="tx1"/>
+                </a:solidFill>
+              </a:rPr>
               <a:t>Asignarse una tarea de otro usuario</a:t>
             </a:r>
-            <a:endParaRPr lang="es-AR" dirty="0"/>
+            <a:endParaRPr lang="es-AR" dirty="0">
+              <a:solidFill>
+                <a:schemeClr val="tx1"/>
+              </a:solidFill>
+            </a:endParaRPr>
           </a:p>
         </p:txBody>
       </p:sp>
@@ -3780,7 +3852,7 @@
         </p:nvSpPr>
         <p:spPr>
           <a:xfrm>
-            <a:off x="8966704" y="3640883"/>
+            <a:off x="9951233" y="3718791"/>
             <a:ext cx="1857270" cy="2810047"/>
           </a:xfrm>
           <a:prstGeom prst="rect">
@@ -3822,14 +3894,16 @@
         </p:nvSpPr>
         <p:spPr>
           <a:xfrm>
-            <a:off x="9149919" y="3865966"/>
+            <a:off x="10134448" y="3943874"/>
             <a:ext cx="1477108" cy="590843"/>
           </a:xfrm>
           <a:prstGeom prst="rect">
             <a:avLst/>
           </a:prstGeom>
           <a:solidFill>
-            <a:schemeClr val="accent2"/>
+            <a:schemeClr val="accent2">
+              <a:lumMod val="75000"/>
+            </a:schemeClr>
           </a:solidFill>
         </p:spPr>
         <p:style>
@@ -3856,14 +3930,14 @@
             <a:r>
               <a:rPr lang="es-AR" dirty="0" smtClean="0">
                 <a:solidFill>
-                  <a:schemeClr val="tx1"/>
+                  <a:schemeClr val="bg1"/>
                 </a:solidFill>
               </a:rPr>
               <a:t>Modificado</a:t>
             </a:r>
             <a:endParaRPr lang="es-AR" dirty="0">
               <a:solidFill>
-                <a:schemeClr val="tx1"/>
+                <a:schemeClr val="bg1"/>
               </a:solidFill>
             </a:endParaRPr>
           </a:p>
@@ -3877,7 +3951,7 @@
         </p:nvSpPr>
         <p:spPr>
           <a:xfrm>
-            <a:off x="9149919" y="4688528"/>
+            <a:off x="10134448" y="4766436"/>
             <a:ext cx="1477108" cy="590843"/>
           </a:xfrm>
           <a:prstGeom prst="rect">
@@ -3932,7 +4006,7 @@
         </p:nvSpPr>
         <p:spPr>
           <a:xfrm>
-            <a:off x="9149919" y="5492708"/>
+            <a:off x="10134448" y="5570616"/>
             <a:ext cx="1477108" cy="590843"/>
           </a:xfrm>
           <a:prstGeom prst="rect">
@@ -3987,7 +4061,7 @@
         </p:nvSpPr>
         <p:spPr>
           <a:xfrm>
-            <a:off x="7874935" y="2746439"/>
+            <a:off x="8411570" y="2369915"/>
             <a:ext cx="1265548" cy="331533"/>
           </a:xfrm>
           <a:prstGeom prst="rect">
@@ -4072,8 +4146,8 @@
         </p:nvCxnSpPr>
         <p:spPr>
           <a:xfrm flipV="1">
-            <a:off x="8520600" y="1280362"/>
-            <a:ext cx="435400" cy="973215"/>
+            <a:off x="9014390" y="1041987"/>
+            <a:ext cx="0" cy="753109"/>
           </a:xfrm>
           <a:prstGeom prst="line">
             <a:avLst/>
@@ -4117,7 +4191,7 @@
         </p:blipFill>
         <p:spPr>
           <a:xfrm>
-            <a:off x="8132089" y="1853748"/>
+            <a:off x="8668724" y="1477224"/>
             <a:ext cx="751241" cy="799658"/>
           </a:xfrm>
           <a:prstGeom prst="rect">
@@ -4133,14 +4207,14 @@
         </p:nvSpPr>
         <p:spPr>
           <a:xfrm>
-            <a:off x="9892843" y="1535534"/>
+            <a:off x="9951233" y="1297159"/>
             <a:ext cx="2052949" cy="995871"/>
           </a:xfrm>
           <a:prstGeom prst="ellipse">
             <a:avLst/>
           </a:prstGeom>
           <a:solidFill>
-            <a:schemeClr val="accent6"/>
+            <a:schemeClr val="bg1"/>
           </a:solidFill>
         </p:spPr>
         <p:style>
@@ -4163,14 +4237,18 @@
           <a:p>
             <a:pPr algn="ctr"/>
             <a:r>
-              <a:rPr lang="es-AR" dirty="0" smtClean="0"/>
-              <a:t>Completar </a:t>
-            </a:r>
-            <a:r>
-              <a:rPr lang="es-AR" dirty="0" smtClean="0"/>
-              <a:t>una tarea de otro usuario</a:t>
-            </a:r>
-            <a:endParaRPr lang="es-AR" dirty="0"/>
+              <a:rPr lang="es-AR" dirty="0" smtClean="0">
+                <a:solidFill>
+                  <a:schemeClr val="tx1"/>
+                </a:solidFill>
+              </a:rPr>
+              <a:t>Completar una tarea de otro usuario</a:t>
+            </a:r>
+            <a:endParaRPr lang="es-AR" dirty="0">
+              <a:solidFill>
+                <a:schemeClr val="tx1"/>
+              </a:solidFill>
+            </a:endParaRPr>
           </a:p>
         </p:txBody>
       </p:sp>
@@ -4189,7 +4267,7 @@
             <a:avLst/>
           </a:prstGeom>
           <a:solidFill>
-            <a:schemeClr val="accent6"/>
+            <a:schemeClr val="bg1"/>
           </a:solidFill>
         </p:spPr>
         <p:style>
@@ -4212,10 +4290,18 @@
           <a:p>
             <a:pPr algn="ctr"/>
             <a:r>
-              <a:rPr lang="es-AR" dirty="0" smtClean="0"/>
+              <a:rPr lang="es-AR" dirty="0" smtClean="0">
+                <a:solidFill>
+                  <a:schemeClr val="tx1"/>
+                </a:solidFill>
+              </a:rPr>
               <a:t>Cargar archivos a una tarea</a:t>
             </a:r>
-            <a:endParaRPr lang="es-AR" dirty="0"/>
+            <a:endParaRPr lang="es-AR" dirty="0">
+              <a:solidFill>
+                <a:schemeClr val="tx1"/>
+              </a:solidFill>
+            </a:endParaRPr>
           </a:p>
         </p:txBody>
       </p:sp>
@@ -4234,7 +4320,7 @@
             <a:avLst/>
           </a:prstGeom>
           <a:solidFill>
-            <a:schemeClr val="accent6"/>
+            <a:schemeClr val="bg1"/>
           </a:solidFill>
         </p:spPr>
         <p:style>
@@ -4257,10 +4343,18 @@
           <a:p>
             <a:pPr algn="ctr"/>
             <a:r>
-              <a:rPr lang="es-AR" dirty="0" smtClean="0"/>
+              <a:rPr lang="es-AR" dirty="0" smtClean="0">
+                <a:solidFill>
+                  <a:schemeClr val="tx1"/>
+                </a:solidFill>
+              </a:rPr>
               <a:t>Cargar archivos a un proyecto</a:t>
             </a:r>
-            <a:endParaRPr lang="es-AR" dirty="0"/>
+            <a:endParaRPr lang="es-AR" dirty="0">
+              <a:solidFill>
+                <a:schemeClr val="tx1"/>
+              </a:solidFill>
+            </a:endParaRPr>
           </a:p>
         </p:txBody>
       </p:sp>
@@ -4279,7 +4373,7 @@
             <a:avLst/>
           </a:prstGeom>
           <a:solidFill>
-            <a:schemeClr val="accent6"/>
+            <a:schemeClr val="bg1"/>
           </a:solidFill>
         </p:spPr>
         <p:style>
@@ -4302,10 +4396,18 @@
           <a:p>
             <a:pPr algn="ctr"/>
             <a:r>
-              <a:rPr lang="es-AR" dirty="0" smtClean="0"/>
+              <a:rPr lang="es-AR" dirty="0" smtClean="0">
+                <a:solidFill>
+                  <a:schemeClr val="tx1"/>
+                </a:solidFill>
+              </a:rPr>
               <a:t>Cambiar estado de una tarea</a:t>
             </a:r>
-            <a:endParaRPr lang="es-AR" dirty="0"/>
+            <a:endParaRPr lang="es-AR" dirty="0">
+              <a:solidFill>
+                <a:schemeClr val="tx1"/>
+              </a:solidFill>
+            </a:endParaRPr>
           </a:p>
         </p:txBody>
       </p:sp>
@@ -4364,6 +4466,195 @@
                 </a:solidFill>
               </a:rPr>
               <a:t>ADMINSTRADOR</a:t>
+            </a:r>
+            <a:endParaRPr lang="es-AR" dirty="0">
+              <a:solidFill>
+                <a:schemeClr val="tx1"/>
+              </a:solidFill>
+            </a:endParaRPr>
+          </a:p>
+        </p:txBody>
+      </p:sp>
+      <p:sp>
+        <p:nvSpPr>
+          <p:cNvPr id="46" name="Elipse 45"/>
+          <p:cNvSpPr/>
+          <p:nvPr/>
+        </p:nvSpPr>
+        <p:spPr>
+          <a:xfrm>
+            <a:off x="6487961" y="263867"/>
+            <a:ext cx="2052949" cy="995871"/>
+          </a:xfrm>
+          <a:prstGeom prst="ellipse">
+            <a:avLst/>
+          </a:prstGeom>
+          <a:solidFill>
+            <a:schemeClr val="accent6"/>
+          </a:solidFill>
+        </p:spPr>
+        <p:style>
+          <a:lnRef idx="3">
+            <a:schemeClr val="lt1"/>
+          </a:lnRef>
+          <a:fillRef idx="1">
+            <a:schemeClr val="accent6"/>
+          </a:fillRef>
+          <a:effectRef idx="1">
+            <a:schemeClr val="accent6"/>
+          </a:effectRef>
+          <a:fontRef idx="minor">
+            <a:schemeClr val="lt1"/>
+          </a:fontRef>
+        </p:style>
+        <p:txBody>
+          <a:bodyPr rtlCol="0" anchor="ctr"/>
+          <a:lstStyle/>
+          <a:p>
+            <a:pPr algn="ctr"/>
+            <a:r>
+              <a:rPr lang="es-AR" dirty="0" smtClean="0">
+                <a:solidFill>
+                  <a:schemeClr val="tx1"/>
+                </a:solidFill>
+              </a:rPr>
+              <a:t>Solicitar carga de dinero</a:t>
+            </a:r>
+            <a:endParaRPr lang="es-AR" dirty="0">
+              <a:solidFill>
+                <a:schemeClr val="tx1"/>
+              </a:solidFill>
+            </a:endParaRPr>
+          </a:p>
+        </p:txBody>
+      </p:sp>
+      <p:sp>
+        <p:nvSpPr>
+          <p:cNvPr id="48" name="Rectángulo 47"/>
+          <p:cNvSpPr/>
+          <p:nvPr/>
+        </p:nvSpPr>
+        <p:spPr>
+          <a:xfrm>
+            <a:off x="7641576" y="6010195"/>
+            <a:ext cx="1889946" cy="331533"/>
+          </a:xfrm>
+          <a:prstGeom prst="rect">
+            <a:avLst/>
+          </a:prstGeom>
+          <a:noFill/>
+        </p:spPr>
+        <p:style>
+          <a:lnRef idx="2">
+            <a:schemeClr val="accent1">
+              <a:shade val="50000"/>
+            </a:schemeClr>
+          </a:lnRef>
+          <a:fillRef idx="1">
+            <a:schemeClr val="accent1"/>
+          </a:fillRef>
+          <a:effectRef idx="0">
+            <a:schemeClr val="accent1"/>
+          </a:effectRef>
+          <a:fontRef idx="minor">
+            <a:schemeClr val="lt1"/>
+          </a:fontRef>
+        </p:style>
+        <p:txBody>
+          <a:bodyPr rtlCol="0" anchor="ctr"/>
+          <a:lstStyle/>
+          <a:p>
+            <a:pPr algn="ctr"/>
+            <a:r>
+              <a:rPr lang="es-AR" dirty="0" smtClean="0">
+                <a:solidFill>
+                  <a:schemeClr val="tx1"/>
+                </a:solidFill>
+              </a:rPr>
+              <a:t>ADMINSITRADOR</a:t>
+            </a:r>
+            <a:endParaRPr lang="es-AR" dirty="0">
+              <a:solidFill>
+                <a:schemeClr val="tx1"/>
+              </a:solidFill>
+            </a:endParaRPr>
+          </a:p>
+        </p:txBody>
+      </p:sp>
+      <p:pic>
+        <p:nvPicPr>
+          <p:cNvPr id="49" name="Imagen 48"/>
+          <p:cNvPicPr>
+            <a:picLocks noChangeAspect="1"/>
+          </p:cNvPicPr>
+          <p:nvPr/>
+        </p:nvPicPr>
+        <p:blipFill>
+          <a:blip r:embed="rId3" cstate="print">
+            <a:extLst>
+              <a:ext uri="{28A0092B-C50C-407E-A947-70E740481C1C}">
+                <a14:useLocalDpi xmlns:a14="http://schemas.microsoft.com/office/drawing/2010/main" val="0"/>
+              </a:ext>
+            </a:extLst>
+          </a:blip>
+          <a:stretch>
+            <a:fillRect/>
+          </a:stretch>
+        </p:blipFill>
+        <p:spPr>
+          <a:xfrm>
+            <a:off x="8235941" y="5117504"/>
+            <a:ext cx="751241" cy="799658"/>
+          </a:xfrm>
+          <a:prstGeom prst="rect">
+            <a:avLst/>
+          </a:prstGeom>
+        </p:spPr>
+      </p:pic>
+      <p:sp>
+        <p:nvSpPr>
+          <p:cNvPr id="50" name="Elipse 49"/>
+          <p:cNvSpPr/>
+          <p:nvPr/>
+        </p:nvSpPr>
+        <p:spPr>
+          <a:xfrm>
+            <a:off x="7641575" y="3445938"/>
+            <a:ext cx="2007812" cy="1135137"/>
+          </a:xfrm>
+          <a:prstGeom prst="ellipse">
+            <a:avLst/>
+          </a:prstGeom>
+          <a:solidFill>
+            <a:schemeClr val="accent6"/>
+          </a:solidFill>
+        </p:spPr>
+        <p:style>
+          <a:lnRef idx="3">
+            <a:schemeClr val="lt1"/>
+          </a:lnRef>
+          <a:fillRef idx="1">
+            <a:schemeClr val="accent6"/>
+          </a:fillRef>
+          <a:effectRef idx="1">
+            <a:schemeClr val="accent6"/>
+          </a:effectRef>
+          <a:fontRef idx="minor">
+            <a:schemeClr val="lt1"/>
+          </a:fontRef>
+        </p:style>
+        <p:txBody>
+          <a:bodyPr rtlCol="0" anchor="ctr"/>
+          <a:lstStyle/>
+          <a:p>
+            <a:pPr algn="ctr"/>
+            <a:r>
+              <a:rPr lang="es-AR" dirty="0" smtClean="0">
+                <a:solidFill>
+                  <a:schemeClr val="tx1"/>
+                </a:solidFill>
+              </a:rPr>
+              <a:t>Aprobar o rechazar un pedido de carga</a:t>
             </a:r>
             <a:endParaRPr lang="es-AR" dirty="0">
               <a:solidFill>

</xml_diff>

<commit_message>
Added files for Entrega 4
</commit_message>
<xml_diff>
--- a/Diagrama de casos de uso.pptx
+++ b/Diagrama de casos de uso.pptx
@@ -243,7 +243,7 @@
           <a:p>
             <a:fld id="{811A9513-F290-4193-B8E3-EE80BB6D121E}" type="datetimeFigureOut">
               <a:rPr lang="es-AR" smtClean="0"/>
-              <a:t>19/6/2021</a:t>
+              <a:t>10/7/2021</a:t>
             </a:fld>
             <a:endParaRPr lang="es-AR"/>
           </a:p>
@@ -413,7 +413,7 @@
           <a:p>
             <a:fld id="{811A9513-F290-4193-B8E3-EE80BB6D121E}" type="datetimeFigureOut">
               <a:rPr lang="es-AR" smtClean="0"/>
-              <a:t>19/6/2021</a:t>
+              <a:t>10/7/2021</a:t>
             </a:fld>
             <a:endParaRPr lang="es-AR"/>
           </a:p>
@@ -593,7 +593,7 @@
           <a:p>
             <a:fld id="{811A9513-F290-4193-B8E3-EE80BB6D121E}" type="datetimeFigureOut">
               <a:rPr lang="es-AR" smtClean="0"/>
-              <a:t>19/6/2021</a:t>
+              <a:t>10/7/2021</a:t>
             </a:fld>
             <a:endParaRPr lang="es-AR"/>
           </a:p>
@@ -763,7 +763,7 @@
           <a:p>
             <a:fld id="{811A9513-F290-4193-B8E3-EE80BB6D121E}" type="datetimeFigureOut">
               <a:rPr lang="es-AR" smtClean="0"/>
-              <a:t>19/6/2021</a:t>
+              <a:t>10/7/2021</a:t>
             </a:fld>
             <a:endParaRPr lang="es-AR"/>
           </a:p>
@@ -1009,7 +1009,7 @@
           <a:p>
             <a:fld id="{811A9513-F290-4193-B8E3-EE80BB6D121E}" type="datetimeFigureOut">
               <a:rPr lang="es-AR" smtClean="0"/>
-              <a:t>19/6/2021</a:t>
+              <a:t>10/7/2021</a:t>
             </a:fld>
             <a:endParaRPr lang="es-AR"/>
           </a:p>
@@ -1241,7 +1241,7 @@
           <a:p>
             <a:fld id="{811A9513-F290-4193-B8E3-EE80BB6D121E}" type="datetimeFigureOut">
               <a:rPr lang="es-AR" smtClean="0"/>
-              <a:t>19/6/2021</a:t>
+              <a:t>10/7/2021</a:t>
             </a:fld>
             <a:endParaRPr lang="es-AR"/>
           </a:p>
@@ -1608,7 +1608,7 @@
           <a:p>
             <a:fld id="{811A9513-F290-4193-B8E3-EE80BB6D121E}" type="datetimeFigureOut">
               <a:rPr lang="es-AR" smtClean="0"/>
-              <a:t>19/6/2021</a:t>
+              <a:t>10/7/2021</a:t>
             </a:fld>
             <a:endParaRPr lang="es-AR"/>
           </a:p>
@@ -1726,7 +1726,7 @@
           <a:p>
             <a:fld id="{811A9513-F290-4193-B8E3-EE80BB6D121E}" type="datetimeFigureOut">
               <a:rPr lang="es-AR" smtClean="0"/>
-              <a:t>19/6/2021</a:t>
+              <a:t>10/7/2021</a:t>
             </a:fld>
             <a:endParaRPr lang="es-AR"/>
           </a:p>
@@ -1821,7 +1821,7 @@
           <a:p>
             <a:fld id="{811A9513-F290-4193-B8E3-EE80BB6D121E}" type="datetimeFigureOut">
               <a:rPr lang="es-AR" smtClean="0"/>
-              <a:t>19/6/2021</a:t>
+              <a:t>10/7/2021</a:t>
             </a:fld>
             <a:endParaRPr lang="es-AR"/>
           </a:p>
@@ -2098,7 +2098,7 @@
           <a:p>
             <a:fld id="{811A9513-F290-4193-B8E3-EE80BB6D121E}" type="datetimeFigureOut">
               <a:rPr lang="es-AR" smtClean="0"/>
-              <a:t>19/6/2021</a:t>
+              <a:t>10/7/2021</a:t>
             </a:fld>
             <a:endParaRPr lang="es-AR"/>
           </a:p>
@@ -2351,7 +2351,7 @@
           <a:p>
             <a:fld id="{811A9513-F290-4193-B8E3-EE80BB6D121E}" type="datetimeFigureOut">
               <a:rPr lang="es-AR" smtClean="0"/>
-              <a:t>19/6/2021</a:t>
+              <a:t>10/7/2021</a:t>
             </a:fld>
             <a:endParaRPr lang="es-AR"/>
           </a:p>
@@ -2564,7 +2564,7 @@
           <a:p>
             <a:fld id="{811A9513-F290-4193-B8E3-EE80BB6D121E}" type="datetimeFigureOut">
               <a:rPr lang="es-AR" smtClean="0"/>
-              <a:t>19/6/2021</a:t>
+              <a:t>10/7/2021</a:t>
             </a:fld>
             <a:endParaRPr lang="es-AR"/>
           </a:p>
@@ -2993,41 +2993,8 @@
         </p:nvCxnSpPr>
         <p:spPr>
           <a:xfrm flipH="1" flipV="1">
-            <a:off x="8645481" y="4581075"/>
+            <a:off x="10541797" y="1511273"/>
             <a:ext cx="23243" cy="926673"/>
-          </a:xfrm>
-          <a:prstGeom prst="line">
-            <a:avLst/>
-          </a:prstGeom>
-          <a:ln w="25400"/>
-        </p:spPr>
-        <p:style>
-          <a:lnRef idx="1">
-            <a:schemeClr val="accent1"/>
-          </a:lnRef>
-          <a:fillRef idx="0">
-            <a:schemeClr val="accent1"/>
-          </a:fillRef>
-          <a:effectRef idx="0">
-            <a:schemeClr val="accent1"/>
-          </a:effectRef>
-          <a:fontRef idx="minor">
-            <a:schemeClr val="tx1"/>
-          </a:fontRef>
-        </p:style>
-      </p:cxnSp>
-      <p:cxnSp>
-        <p:nvCxnSpPr>
-          <p:cNvPr id="47" name="Conector recto 46"/>
-          <p:cNvCxnSpPr>
-            <a:endCxn id="46" idx="5"/>
-          </p:cNvCxnSpPr>
-          <p:nvPr/>
-        </p:nvCxnSpPr>
-        <p:spPr>
-          <a:xfrm flipH="1" flipV="1">
-            <a:off x="8240263" y="1113896"/>
-            <a:ext cx="831915" cy="732984"/>
           </a:xfrm>
           <a:prstGeom prst="line">
             <a:avLst/>
@@ -3059,8 +3026,8 @@
         </p:nvCxnSpPr>
         <p:spPr>
           <a:xfrm>
-            <a:off x="3680688" y="3236366"/>
-            <a:ext cx="1488227" cy="639929"/>
+            <a:off x="3672542" y="3171452"/>
+            <a:ext cx="2295326" cy="3026737"/>
           </a:xfrm>
           <a:prstGeom prst="line">
             <a:avLst/>
@@ -3091,9 +3058,9 @@
           <p:nvPr/>
         </p:nvCxnSpPr>
         <p:spPr>
-          <a:xfrm flipV="1">
-            <a:off x="3764573" y="2766215"/>
-            <a:ext cx="1204263" cy="477329"/>
+          <a:xfrm>
+            <a:off x="3681923" y="3212678"/>
+            <a:ext cx="3001849" cy="989036"/>
           </a:xfrm>
           <a:prstGeom prst="line">
             <a:avLst/>
@@ -3119,14 +3086,14 @@
         <p:nvCxnSpPr>
           <p:cNvPr id="44" name="Conector recto 43"/>
           <p:cNvCxnSpPr>
-            <a:endCxn id="41" idx="2"/>
+            <a:endCxn id="41" idx="0"/>
           </p:cNvCxnSpPr>
           <p:nvPr/>
         </p:nvCxnSpPr>
         <p:spPr>
           <a:xfrm>
-            <a:off x="3679432" y="3255622"/>
-            <a:ext cx="1455114" cy="1754191"/>
+            <a:off x="3696598" y="3197275"/>
+            <a:ext cx="868343" cy="2623118"/>
           </a:xfrm>
           <a:prstGeom prst="line">
             <a:avLst/>
@@ -3148,37 +3115,6 @@
           </a:fontRef>
         </p:style>
       </p:cxnSp>
-      <p:cxnSp>
-        <p:nvCxnSpPr>
-          <p:cNvPr id="32" name="Conector recto 31"/>
-          <p:cNvCxnSpPr/>
-          <p:nvPr/>
-        </p:nvCxnSpPr>
-        <p:spPr>
-          <a:xfrm flipV="1">
-            <a:off x="9014390" y="1795096"/>
-            <a:ext cx="936843" cy="103569"/>
-          </a:xfrm>
-          <a:prstGeom prst="line">
-            <a:avLst/>
-          </a:prstGeom>
-          <a:ln w="25400"/>
-        </p:spPr>
-        <p:style>
-          <a:lnRef idx="1">
-            <a:schemeClr val="accent1"/>
-          </a:lnRef>
-          <a:fillRef idx="0">
-            <a:schemeClr val="accent1"/>
-          </a:fillRef>
-          <a:effectRef idx="0">
-            <a:schemeClr val="accent1"/>
-          </a:effectRef>
-          <a:fontRef idx="minor">
-            <a:schemeClr val="tx1"/>
-          </a:fontRef>
-        </p:style>
-      </p:cxnSp>
       <p:sp>
         <p:nvSpPr>
           <p:cNvPr id="2" name="Título 1"/>
@@ -3215,7 +3151,7 @@
         </p:nvSpPr>
         <p:spPr>
           <a:xfrm>
-            <a:off x="4027797" y="1081488"/>
+            <a:off x="4045201" y="688002"/>
             <a:ext cx="1895860" cy="1123407"/>
           </a:xfrm>
           <a:prstGeom prst="ellipse">
@@ -3262,7 +3198,7 @@
         </p:nvSpPr>
         <p:spPr>
           <a:xfrm>
-            <a:off x="1934401" y="1262339"/>
+            <a:off x="2011492" y="989097"/>
             <a:ext cx="1925764" cy="870188"/>
           </a:xfrm>
           <a:prstGeom prst="ellipse">
@@ -3315,7 +3251,7 @@
         </p:nvSpPr>
         <p:spPr>
           <a:xfrm>
-            <a:off x="613815" y="1945089"/>
+            <a:off x="375009" y="1356477"/>
             <a:ext cx="1660525" cy="979187"/>
           </a:xfrm>
           <a:prstGeom prst="ellipse">
@@ -3368,7 +3304,7 @@
         </p:nvSpPr>
         <p:spPr>
           <a:xfrm>
-            <a:off x="301132" y="3117534"/>
+            <a:off x="157651" y="2437946"/>
             <a:ext cx="1660526" cy="1046698"/>
           </a:xfrm>
           <a:prstGeom prst="ellipse">
@@ -3421,14 +3357,16 @@
         </p:nvSpPr>
         <p:spPr>
           <a:xfrm>
-            <a:off x="3764573" y="5455471"/>
+            <a:off x="1628960" y="5718330"/>
             <a:ext cx="1848732" cy="886257"/>
           </a:xfrm>
           <a:prstGeom prst="ellipse">
             <a:avLst/>
           </a:prstGeom>
           <a:solidFill>
-            <a:schemeClr val="bg1"/>
+            <a:schemeClr val="accent2">
+              <a:lumMod val="75000"/>
+            </a:schemeClr>
           </a:solidFill>
         </p:spPr>
         <p:style>
@@ -3453,14 +3391,14 @@
             <a:r>
               <a:rPr lang="es-AR" dirty="0" smtClean="0">
                 <a:solidFill>
-                  <a:schemeClr val="tx1"/>
+                  <a:schemeClr val="bg1"/>
                 </a:solidFill>
               </a:rPr>
               <a:t>Eliminar una tarea propia</a:t>
             </a:r>
             <a:endParaRPr lang="es-AR" dirty="0">
               <a:solidFill>
-                <a:schemeClr val="tx1"/>
+                <a:schemeClr val="bg1"/>
               </a:solidFill>
             </a:endParaRPr>
           </a:p>
@@ -3474,7 +3412,7 @@
         </p:nvSpPr>
         <p:spPr>
           <a:xfrm>
-            <a:off x="8713743" y="191958"/>
+            <a:off x="6971774" y="1526941"/>
             <a:ext cx="2052949" cy="995871"/>
           </a:xfrm>
           <a:prstGeom prst="ellipse">
@@ -3527,14 +3465,16 @@
         </p:nvSpPr>
         <p:spPr>
           <a:xfrm>
-            <a:off x="665727" y="4349128"/>
+            <a:off x="157651" y="3717582"/>
             <a:ext cx="1957464" cy="990973"/>
           </a:xfrm>
           <a:prstGeom prst="ellipse">
             <a:avLst/>
           </a:prstGeom>
           <a:solidFill>
-            <a:schemeClr val="bg1"/>
+            <a:schemeClr val="accent2">
+              <a:lumMod val="75000"/>
+            </a:schemeClr>
           </a:solidFill>
         </p:spPr>
         <p:style>
@@ -3559,14 +3499,14 @@
             <a:r>
               <a:rPr lang="es-AR" dirty="0" smtClean="0">
                 <a:solidFill>
-                  <a:schemeClr val="tx1"/>
+                  <a:schemeClr val="bg1"/>
                 </a:solidFill>
               </a:rPr>
               <a:t>Eliminar un proyecto propio</a:t>
             </a:r>
             <a:endParaRPr lang="es-AR" dirty="0">
               <a:solidFill>
-                <a:schemeClr val="tx1"/>
+                <a:schemeClr val="bg1"/>
               </a:solidFill>
             </a:endParaRPr>
           </a:p>
@@ -3575,13 +3515,15 @@
       <p:cxnSp>
         <p:nvCxnSpPr>
           <p:cNvPr id="15" name="Conector recto 14"/>
-          <p:cNvCxnSpPr/>
+          <p:cNvCxnSpPr>
+            <a:stCxn id="7" idx="4"/>
+          </p:cNvCxnSpPr>
           <p:nvPr/>
         </p:nvCxnSpPr>
         <p:spPr>
           <a:xfrm>
-            <a:off x="3191669" y="2141970"/>
-            <a:ext cx="535998" cy="1065385"/>
+            <a:off x="2974374" y="1859285"/>
+            <a:ext cx="753293" cy="1348070"/>
           </a:xfrm>
           <a:prstGeom prst="line">
             <a:avLst/>
@@ -3606,13 +3548,15 @@
       <p:cxnSp>
         <p:nvCxnSpPr>
           <p:cNvPr id="16" name="Conector recto 15"/>
-          <p:cNvCxnSpPr/>
+          <p:cNvCxnSpPr>
+            <a:endCxn id="6" idx="3"/>
+          </p:cNvCxnSpPr>
           <p:nvPr/>
         </p:nvCxnSpPr>
         <p:spPr>
           <a:xfrm flipV="1">
-            <a:off x="3802450" y="2141970"/>
-            <a:ext cx="748963" cy="1038734"/>
+            <a:off x="3672542" y="1646890"/>
+            <a:ext cx="650301" cy="1681355"/>
           </a:xfrm>
           <a:prstGeom prst="line">
             <a:avLst/>
@@ -3637,13 +3581,15 @@
       <p:cxnSp>
         <p:nvCxnSpPr>
           <p:cNvPr id="17" name="Conector recto 16"/>
-          <p:cNvCxnSpPr/>
+          <p:cNvCxnSpPr>
+            <a:stCxn id="9" idx="5"/>
+          </p:cNvCxnSpPr>
           <p:nvPr/>
         </p:nvCxnSpPr>
         <p:spPr>
           <a:xfrm>
-            <a:off x="2221081" y="2653406"/>
-            <a:ext cx="1506586" cy="553949"/>
+            <a:off x="1792356" y="2192265"/>
+            <a:ext cx="1935311" cy="1015090"/>
           </a:xfrm>
           <a:prstGeom prst="line">
             <a:avLst/>
@@ -3674,9 +3620,9 @@
           <p:nvPr/>
         </p:nvCxnSpPr>
         <p:spPr>
-          <a:xfrm flipV="1">
-            <a:off x="1961658" y="3211289"/>
-            <a:ext cx="1783037" cy="429594"/>
+          <a:xfrm>
+            <a:off x="1818177" y="2961295"/>
+            <a:ext cx="1827081" cy="210157"/>
           </a:xfrm>
           <a:prstGeom prst="line">
             <a:avLst/>
@@ -3701,13 +3647,15 @@
       <p:cxnSp>
         <p:nvCxnSpPr>
           <p:cNvPr id="21" name="Conector recto 20"/>
-          <p:cNvCxnSpPr/>
+          <p:cNvCxnSpPr>
+            <a:endCxn id="33" idx="7"/>
+          </p:cNvCxnSpPr>
           <p:nvPr/>
         </p:nvCxnSpPr>
         <p:spPr>
           <a:xfrm flipH="1">
-            <a:off x="2836668" y="3202850"/>
-            <a:ext cx="883432" cy="2269934"/>
+            <a:off x="1961534" y="3268448"/>
+            <a:ext cx="1678857" cy="1865290"/>
           </a:xfrm>
           <a:prstGeom prst="line">
             <a:avLst/>
@@ -3732,13 +3680,15 @@
       <p:cxnSp>
         <p:nvCxnSpPr>
           <p:cNvPr id="23" name="Conector recto 22"/>
-          <p:cNvCxnSpPr/>
+          <p:cNvCxnSpPr>
+            <a:stCxn id="13" idx="6"/>
+          </p:cNvCxnSpPr>
           <p:nvPr/>
         </p:nvCxnSpPr>
         <p:spPr>
           <a:xfrm flipV="1">
-            <a:off x="2521926" y="3207355"/>
-            <a:ext cx="1242647" cy="1443552"/>
+            <a:off x="2115115" y="3207355"/>
+            <a:ext cx="1649458" cy="1005714"/>
           </a:xfrm>
           <a:prstGeom prst="line">
             <a:avLst/>
@@ -3768,14 +3718,16 @@
         </p:nvSpPr>
         <p:spPr>
           <a:xfrm>
-            <a:off x="1608505" y="5465113"/>
+            <a:off x="291773" y="5006773"/>
             <a:ext cx="1956247" cy="866974"/>
           </a:xfrm>
           <a:prstGeom prst="ellipse">
             <a:avLst/>
           </a:prstGeom>
           <a:solidFill>
-            <a:schemeClr val="bg1"/>
+            <a:schemeClr val="accent2">
+              <a:lumMod val="75000"/>
+            </a:schemeClr>
           </a:solidFill>
         </p:spPr>
         <p:style>
@@ -3800,14 +3752,14 @@
             <a:r>
               <a:rPr lang="es-AR" dirty="0" smtClean="0">
                 <a:solidFill>
-                  <a:schemeClr val="tx1"/>
+                  <a:schemeClr val="bg1"/>
                 </a:solidFill>
               </a:rPr>
               <a:t>Eliminar el perfil de usuario</a:t>
             </a:r>
             <a:endParaRPr lang="es-AR" dirty="0">
               <a:solidFill>
-                <a:schemeClr val="tx1"/>
+                <a:schemeClr val="bg1"/>
               </a:solidFill>
             </a:endParaRPr>
           </a:p>
@@ -3816,13 +3768,15 @@
       <p:cxnSp>
         <p:nvCxnSpPr>
           <p:cNvPr id="34" name="Conector recto 33"/>
-          <p:cNvCxnSpPr/>
+          <p:cNvCxnSpPr>
+            <a:stCxn id="11" idx="0"/>
+          </p:cNvCxnSpPr>
           <p:nvPr/>
         </p:nvCxnSpPr>
         <p:spPr>
-          <a:xfrm flipH="1" flipV="1">
-            <a:off x="3732148" y="3202851"/>
-            <a:ext cx="611106" cy="2342758"/>
+          <a:xfrm flipV="1">
+            <a:off x="2553326" y="3235757"/>
+            <a:ext cx="1128597" cy="2482573"/>
           </a:xfrm>
           <a:prstGeom prst="line">
             <a:avLst/>
@@ -4055,14 +4009,228 @@
       </p:sp>
       <p:sp>
         <p:nvSpPr>
-          <p:cNvPr id="40" name="Rectángulo 39"/>
+          <p:cNvPr id="28" name="Elipse 27"/>
           <p:cNvSpPr/>
           <p:nvPr/>
         </p:nvSpPr>
         <p:spPr>
           <a:xfrm>
-            <a:off x="8411570" y="2369915"/>
-            <a:ext cx="1265548" cy="331533"/>
+            <a:off x="6792469" y="2629822"/>
+            <a:ext cx="2052949" cy="995871"/>
+          </a:xfrm>
+          <a:prstGeom prst="ellipse">
+            <a:avLst/>
+          </a:prstGeom>
+          <a:solidFill>
+            <a:schemeClr val="bg1"/>
+          </a:solidFill>
+        </p:spPr>
+        <p:style>
+          <a:lnRef idx="3">
+            <a:schemeClr val="lt1"/>
+          </a:lnRef>
+          <a:fillRef idx="1">
+            <a:schemeClr val="accent6"/>
+          </a:fillRef>
+          <a:effectRef idx="1">
+            <a:schemeClr val="accent6"/>
+          </a:effectRef>
+          <a:fontRef idx="minor">
+            <a:schemeClr val="lt1"/>
+          </a:fontRef>
+        </p:style>
+        <p:txBody>
+          <a:bodyPr rtlCol="0" anchor="ctr"/>
+          <a:lstStyle/>
+          <a:p>
+            <a:pPr algn="ctr"/>
+            <a:r>
+              <a:rPr lang="es-AR" dirty="0" smtClean="0">
+                <a:solidFill>
+                  <a:schemeClr val="tx1"/>
+                </a:solidFill>
+              </a:rPr>
+              <a:t>Completar una tarea de otro usuario</a:t>
+            </a:r>
+            <a:endParaRPr lang="es-AR" dirty="0">
+              <a:solidFill>
+                <a:schemeClr val="tx1"/>
+              </a:solidFill>
+            </a:endParaRPr>
+          </a:p>
+        </p:txBody>
+      </p:sp>
+      <p:sp>
+        <p:nvSpPr>
+          <p:cNvPr id="29" name="Elipse 28"/>
+          <p:cNvSpPr/>
+          <p:nvPr/>
+        </p:nvSpPr>
+        <p:spPr>
+          <a:xfrm>
+            <a:off x="6683772" y="3703778"/>
+            <a:ext cx="2052949" cy="995871"/>
+          </a:xfrm>
+          <a:prstGeom prst="ellipse">
+            <a:avLst/>
+          </a:prstGeom>
+          <a:solidFill>
+            <a:schemeClr val="bg1"/>
+          </a:solidFill>
+        </p:spPr>
+        <p:style>
+          <a:lnRef idx="3">
+            <a:schemeClr val="lt1"/>
+          </a:lnRef>
+          <a:fillRef idx="1">
+            <a:schemeClr val="accent6"/>
+          </a:fillRef>
+          <a:effectRef idx="1">
+            <a:schemeClr val="accent6"/>
+          </a:effectRef>
+          <a:fontRef idx="minor">
+            <a:schemeClr val="lt1"/>
+          </a:fontRef>
+        </p:style>
+        <p:txBody>
+          <a:bodyPr rtlCol="0" anchor="ctr"/>
+          <a:lstStyle/>
+          <a:p>
+            <a:pPr algn="ctr"/>
+            <a:r>
+              <a:rPr lang="es-AR" dirty="0" smtClean="0">
+                <a:solidFill>
+                  <a:schemeClr val="tx1"/>
+                </a:solidFill>
+              </a:rPr>
+              <a:t>Cargar archivos a una tarea</a:t>
+            </a:r>
+            <a:endParaRPr lang="es-AR" dirty="0">
+              <a:solidFill>
+                <a:schemeClr val="tx1"/>
+              </a:solidFill>
+            </a:endParaRPr>
+          </a:p>
+        </p:txBody>
+      </p:sp>
+      <p:sp>
+        <p:nvSpPr>
+          <p:cNvPr id="35" name="Elipse 34"/>
+          <p:cNvSpPr/>
+          <p:nvPr/>
+        </p:nvSpPr>
+        <p:spPr>
+          <a:xfrm>
+            <a:off x="5967868" y="5700253"/>
+            <a:ext cx="2052949" cy="995871"/>
+          </a:xfrm>
+          <a:prstGeom prst="ellipse">
+            <a:avLst/>
+          </a:prstGeom>
+          <a:solidFill>
+            <a:schemeClr val="bg1"/>
+          </a:solidFill>
+        </p:spPr>
+        <p:style>
+          <a:lnRef idx="3">
+            <a:schemeClr val="lt1"/>
+          </a:lnRef>
+          <a:fillRef idx="1">
+            <a:schemeClr val="accent6"/>
+          </a:fillRef>
+          <a:effectRef idx="1">
+            <a:schemeClr val="accent6"/>
+          </a:effectRef>
+          <a:fontRef idx="minor">
+            <a:schemeClr val="lt1"/>
+          </a:fontRef>
+        </p:style>
+        <p:txBody>
+          <a:bodyPr rtlCol="0" anchor="ctr"/>
+          <a:lstStyle/>
+          <a:p>
+            <a:pPr algn="ctr"/>
+            <a:r>
+              <a:rPr lang="es-AR" dirty="0" smtClean="0">
+                <a:solidFill>
+                  <a:schemeClr val="tx1"/>
+                </a:solidFill>
+              </a:rPr>
+              <a:t>Cargar archivos a un proyecto</a:t>
+            </a:r>
+            <a:endParaRPr lang="es-AR" dirty="0">
+              <a:solidFill>
+                <a:schemeClr val="tx1"/>
+              </a:solidFill>
+            </a:endParaRPr>
+          </a:p>
+        </p:txBody>
+      </p:sp>
+      <p:sp>
+        <p:nvSpPr>
+          <p:cNvPr id="41" name="Elipse 40"/>
+          <p:cNvSpPr/>
+          <p:nvPr/>
+        </p:nvSpPr>
+        <p:spPr>
+          <a:xfrm>
+            <a:off x="3538466" y="5820393"/>
+            <a:ext cx="2052949" cy="995871"/>
+          </a:xfrm>
+          <a:prstGeom prst="ellipse">
+            <a:avLst/>
+          </a:prstGeom>
+          <a:solidFill>
+            <a:schemeClr val="accent2">
+              <a:lumMod val="75000"/>
+            </a:schemeClr>
+          </a:solidFill>
+        </p:spPr>
+        <p:style>
+          <a:lnRef idx="3">
+            <a:schemeClr val="lt1"/>
+          </a:lnRef>
+          <a:fillRef idx="1">
+            <a:schemeClr val="accent6"/>
+          </a:fillRef>
+          <a:effectRef idx="1">
+            <a:schemeClr val="accent6"/>
+          </a:effectRef>
+          <a:fontRef idx="minor">
+            <a:schemeClr val="lt1"/>
+          </a:fontRef>
+        </p:style>
+        <p:txBody>
+          <a:bodyPr rtlCol="0" anchor="ctr"/>
+          <a:lstStyle/>
+          <a:p>
+            <a:pPr algn="ctr"/>
+            <a:r>
+              <a:rPr lang="es-AR" dirty="0" smtClean="0">
+                <a:solidFill>
+                  <a:schemeClr val="bg1"/>
+                </a:solidFill>
+              </a:rPr>
+              <a:t>Cambiar estado de una tarea</a:t>
+            </a:r>
+            <a:endParaRPr lang="es-AR" dirty="0">
+              <a:solidFill>
+                <a:schemeClr val="bg1"/>
+              </a:solidFill>
+            </a:endParaRPr>
+          </a:p>
+        </p:txBody>
+      </p:sp>
+      <p:sp>
+        <p:nvSpPr>
+          <p:cNvPr id="42" name="Rectángulo 41"/>
+          <p:cNvSpPr/>
+          <p:nvPr/>
+        </p:nvSpPr>
+        <p:spPr>
+          <a:xfrm>
+            <a:off x="3105158" y="3717582"/>
+            <a:ext cx="1143367" cy="392243"/>
           </a:xfrm>
           <a:prstGeom prst="rect">
             <a:avLst/>
@@ -4098,6 +4266,59 @@
               </a:rPr>
               <a:t>USUARIO</a:t>
             </a:r>
+            <a:endParaRPr lang="es-AR" dirty="0" smtClean="0">
+              <a:solidFill>
+                <a:schemeClr val="tx1"/>
+              </a:solidFill>
+            </a:endParaRPr>
+          </a:p>
+        </p:txBody>
+      </p:sp>
+      <p:sp>
+        <p:nvSpPr>
+          <p:cNvPr id="46" name="Elipse 45"/>
+          <p:cNvSpPr/>
+          <p:nvPr/>
+        </p:nvSpPr>
+        <p:spPr>
+          <a:xfrm>
+            <a:off x="6099995" y="508510"/>
+            <a:ext cx="2052949" cy="995871"/>
+          </a:xfrm>
+          <a:prstGeom prst="ellipse">
+            <a:avLst/>
+          </a:prstGeom>
+          <a:solidFill>
+            <a:schemeClr val="bg1"/>
+          </a:solidFill>
+        </p:spPr>
+        <p:style>
+          <a:lnRef idx="3">
+            <a:schemeClr val="lt1"/>
+          </a:lnRef>
+          <a:fillRef idx="1">
+            <a:schemeClr val="accent6"/>
+          </a:fillRef>
+          <a:effectRef idx="1">
+            <a:schemeClr val="accent6"/>
+          </a:effectRef>
+          <a:fontRef idx="minor">
+            <a:schemeClr val="lt1"/>
+          </a:fontRef>
+        </p:style>
+        <p:txBody>
+          <a:bodyPr rtlCol="0" anchor="ctr"/>
+          <a:lstStyle/>
+          <a:p>
+            <a:pPr algn="ctr"/>
+            <a:r>
+              <a:rPr lang="es-AR" dirty="0" smtClean="0">
+                <a:solidFill>
+                  <a:schemeClr val="tx1"/>
+                </a:solidFill>
+              </a:rPr>
+              <a:t>Solicitar carga de dinero</a:t>
+            </a:r>
             <a:endParaRPr lang="es-AR" dirty="0">
               <a:solidFill>
                 <a:schemeClr val="tx1"/>
@@ -4106,6 +4327,329 @@
           </a:p>
         </p:txBody>
       </p:sp>
+      <p:sp>
+        <p:nvSpPr>
+          <p:cNvPr id="48" name="Rectángulo 47"/>
+          <p:cNvSpPr/>
+          <p:nvPr/>
+        </p:nvSpPr>
+        <p:spPr>
+          <a:xfrm>
+            <a:off x="9537892" y="2940393"/>
+            <a:ext cx="1889946" cy="331533"/>
+          </a:xfrm>
+          <a:prstGeom prst="rect">
+            <a:avLst/>
+          </a:prstGeom>
+          <a:noFill/>
+        </p:spPr>
+        <p:style>
+          <a:lnRef idx="2">
+            <a:schemeClr val="accent1">
+              <a:shade val="50000"/>
+            </a:schemeClr>
+          </a:lnRef>
+          <a:fillRef idx="1">
+            <a:schemeClr val="accent1"/>
+          </a:fillRef>
+          <a:effectRef idx="0">
+            <a:schemeClr val="accent1"/>
+          </a:effectRef>
+          <a:fontRef idx="minor">
+            <a:schemeClr val="lt1"/>
+          </a:fontRef>
+        </p:style>
+        <p:txBody>
+          <a:bodyPr rtlCol="0" anchor="ctr"/>
+          <a:lstStyle/>
+          <a:p>
+            <a:pPr algn="ctr"/>
+            <a:r>
+              <a:rPr lang="es-AR" dirty="0" smtClean="0">
+                <a:solidFill>
+                  <a:schemeClr val="tx1"/>
+                </a:solidFill>
+              </a:rPr>
+              <a:t>ADMINISTRADOR</a:t>
+            </a:r>
+            <a:endParaRPr lang="es-AR" dirty="0">
+              <a:solidFill>
+                <a:schemeClr val="tx1"/>
+              </a:solidFill>
+            </a:endParaRPr>
+          </a:p>
+        </p:txBody>
+      </p:sp>
+      <p:pic>
+        <p:nvPicPr>
+          <p:cNvPr id="49" name="Imagen 48"/>
+          <p:cNvPicPr>
+            <a:picLocks noChangeAspect="1"/>
+          </p:cNvPicPr>
+          <p:nvPr/>
+        </p:nvPicPr>
+        <p:blipFill>
+          <a:blip r:embed="rId3" cstate="print">
+            <a:extLst>
+              <a:ext uri="{28A0092B-C50C-407E-A947-70E740481C1C}">
+                <a14:useLocalDpi xmlns:a14="http://schemas.microsoft.com/office/drawing/2010/main" val="0"/>
+              </a:ext>
+            </a:extLst>
+          </a:blip>
+          <a:stretch>
+            <a:fillRect/>
+          </a:stretch>
+        </p:blipFill>
+        <p:spPr>
+          <a:xfrm>
+            <a:off x="10132257" y="2047702"/>
+            <a:ext cx="751241" cy="799658"/>
+          </a:xfrm>
+          <a:prstGeom prst="rect">
+            <a:avLst/>
+          </a:prstGeom>
+        </p:spPr>
+      </p:pic>
+      <p:sp>
+        <p:nvSpPr>
+          <p:cNvPr id="50" name="Elipse 49"/>
+          <p:cNvSpPr/>
+          <p:nvPr/>
+        </p:nvSpPr>
+        <p:spPr>
+          <a:xfrm>
+            <a:off x="9537891" y="376136"/>
+            <a:ext cx="2007812" cy="1135137"/>
+          </a:xfrm>
+          <a:prstGeom prst="ellipse">
+            <a:avLst/>
+          </a:prstGeom>
+          <a:solidFill>
+            <a:schemeClr val="accent2">
+              <a:lumMod val="75000"/>
+            </a:schemeClr>
+          </a:solidFill>
+        </p:spPr>
+        <p:style>
+          <a:lnRef idx="3">
+            <a:schemeClr val="lt1"/>
+          </a:lnRef>
+          <a:fillRef idx="1">
+            <a:schemeClr val="accent6"/>
+          </a:fillRef>
+          <a:effectRef idx="1">
+            <a:schemeClr val="accent6"/>
+          </a:effectRef>
+          <a:fontRef idx="minor">
+            <a:schemeClr val="lt1"/>
+          </a:fontRef>
+        </p:style>
+        <p:txBody>
+          <a:bodyPr rtlCol="0" anchor="ctr"/>
+          <a:lstStyle/>
+          <a:p>
+            <a:pPr algn="ctr"/>
+            <a:r>
+              <a:rPr lang="es-AR" dirty="0" smtClean="0">
+                <a:solidFill>
+                  <a:schemeClr val="bg1"/>
+                </a:solidFill>
+              </a:rPr>
+              <a:t>Aprobar o rechazar un pedido de carga</a:t>
+            </a:r>
+            <a:endParaRPr lang="es-AR" dirty="0">
+              <a:solidFill>
+                <a:schemeClr val="bg1"/>
+              </a:solidFill>
+            </a:endParaRPr>
+          </a:p>
+        </p:txBody>
+      </p:sp>
+      <p:cxnSp>
+        <p:nvCxnSpPr>
+          <p:cNvPr id="52" name="Conector recto 51"/>
+          <p:cNvCxnSpPr>
+            <a:endCxn id="46" idx="3"/>
+          </p:cNvCxnSpPr>
+          <p:nvPr/>
+        </p:nvCxnSpPr>
+        <p:spPr>
+          <a:xfrm flipV="1">
+            <a:off x="3723455" y="1358539"/>
+            <a:ext cx="2677187" cy="1854139"/>
+          </a:xfrm>
+          <a:prstGeom prst="line">
+            <a:avLst/>
+          </a:prstGeom>
+          <a:ln w="25400"/>
+        </p:spPr>
+        <p:style>
+          <a:lnRef idx="1">
+            <a:schemeClr val="accent1"/>
+          </a:lnRef>
+          <a:fillRef idx="0">
+            <a:schemeClr val="accent1"/>
+          </a:fillRef>
+          <a:effectRef idx="0">
+            <a:schemeClr val="accent1"/>
+          </a:effectRef>
+          <a:fontRef idx="minor">
+            <a:schemeClr val="tx1"/>
+          </a:fontRef>
+        </p:style>
+      </p:cxnSp>
+      <p:cxnSp>
+        <p:nvCxnSpPr>
+          <p:cNvPr id="53" name="Conector recto 52"/>
+          <p:cNvCxnSpPr>
+            <a:endCxn id="12" idx="2"/>
+          </p:cNvCxnSpPr>
+          <p:nvPr/>
+        </p:nvCxnSpPr>
+        <p:spPr>
+          <a:xfrm flipV="1">
+            <a:off x="3714074" y="2024877"/>
+            <a:ext cx="3257700" cy="1204850"/>
+          </a:xfrm>
+          <a:prstGeom prst="line">
+            <a:avLst/>
+          </a:prstGeom>
+          <a:ln w="25400"/>
+        </p:spPr>
+        <p:style>
+          <a:lnRef idx="1">
+            <a:schemeClr val="accent1"/>
+          </a:lnRef>
+          <a:fillRef idx="0">
+            <a:schemeClr val="accent1"/>
+          </a:fillRef>
+          <a:effectRef idx="0">
+            <a:schemeClr val="accent1"/>
+          </a:effectRef>
+          <a:fontRef idx="minor">
+            <a:schemeClr val="tx1"/>
+          </a:fontRef>
+        </p:style>
+      </p:cxnSp>
+      <p:cxnSp>
+        <p:nvCxnSpPr>
+          <p:cNvPr id="55" name="Conector recto 54"/>
+          <p:cNvCxnSpPr>
+            <a:endCxn id="28" idx="2"/>
+          </p:cNvCxnSpPr>
+          <p:nvPr/>
+        </p:nvCxnSpPr>
+        <p:spPr>
+          <a:xfrm flipV="1">
+            <a:off x="3671079" y="3127758"/>
+            <a:ext cx="3121390" cy="96066"/>
+          </a:xfrm>
+          <a:prstGeom prst="line">
+            <a:avLst/>
+          </a:prstGeom>
+          <a:ln w="25400"/>
+        </p:spPr>
+        <p:style>
+          <a:lnRef idx="1">
+            <a:schemeClr val="accent1"/>
+          </a:lnRef>
+          <a:fillRef idx="0">
+            <a:schemeClr val="accent1"/>
+          </a:fillRef>
+          <a:effectRef idx="0">
+            <a:schemeClr val="accent1"/>
+          </a:effectRef>
+          <a:fontRef idx="minor">
+            <a:schemeClr val="tx1"/>
+          </a:fontRef>
+        </p:style>
+      </p:cxnSp>
+      <p:sp>
+        <p:nvSpPr>
+          <p:cNvPr id="60" name="Elipse 59"/>
+          <p:cNvSpPr/>
+          <p:nvPr/>
+        </p:nvSpPr>
+        <p:spPr>
+          <a:xfrm>
+            <a:off x="7369109" y="4766436"/>
+            <a:ext cx="2052949" cy="1115068"/>
+          </a:xfrm>
+          <a:prstGeom prst="ellipse">
+            <a:avLst/>
+          </a:prstGeom>
+          <a:solidFill>
+            <a:schemeClr val="accent6"/>
+          </a:solidFill>
+        </p:spPr>
+        <p:style>
+          <a:lnRef idx="3">
+            <a:schemeClr val="lt1"/>
+          </a:lnRef>
+          <a:fillRef idx="1">
+            <a:schemeClr val="accent6"/>
+          </a:fillRef>
+          <a:effectRef idx="1">
+            <a:schemeClr val="accent6"/>
+          </a:effectRef>
+          <a:fontRef idx="minor">
+            <a:schemeClr val="lt1"/>
+          </a:fontRef>
+        </p:style>
+        <p:txBody>
+          <a:bodyPr rtlCol="0" anchor="ctr"/>
+          <a:lstStyle/>
+          <a:p>
+            <a:pPr algn="ctr"/>
+            <a:r>
+              <a:rPr lang="es-AR" dirty="0" smtClean="0">
+                <a:solidFill>
+                  <a:schemeClr val="tx1"/>
+                </a:solidFill>
+              </a:rPr>
+              <a:t>Publicar un mensaje en chat de una tarea</a:t>
+            </a:r>
+            <a:endParaRPr lang="es-AR" dirty="0">
+              <a:solidFill>
+                <a:schemeClr val="tx1"/>
+              </a:solidFill>
+            </a:endParaRPr>
+          </a:p>
+        </p:txBody>
+      </p:sp>
+      <p:cxnSp>
+        <p:nvCxnSpPr>
+          <p:cNvPr id="61" name="Conector recto 60"/>
+          <p:cNvCxnSpPr>
+            <a:endCxn id="60" idx="2"/>
+          </p:cNvCxnSpPr>
+          <p:nvPr/>
+        </p:nvCxnSpPr>
+        <p:spPr>
+          <a:xfrm>
+            <a:off x="3690820" y="3250434"/>
+            <a:ext cx="3678289" cy="2073536"/>
+          </a:xfrm>
+          <a:prstGeom prst="line">
+            <a:avLst/>
+          </a:prstGeom>
+          <a:ln w="25400"/>
+        </p:spPr>
+        <p:style>
+          <a:lnRef idx="1">
+            <a:schemeClr val="accent1"/>
+          </a:lnRef>
+          <a:fillRef idx="0">
+            <a:schemeClr val="accent1"/>
+          </a:fillRef>
+          <a:effectRef idx="0">
+            <a:schemeClr val="accent1"/>
+          </a:effectRef>
+          <a:fontRef idx="minor">
+            <a:schemeClr val="tx1"/>
+          </a:fontRef>
+        </p:style>
+      </p:cxnSp>
       <p:pic>
         <p:nvPicPr>
           <p:cNvPr id="8" name="Imagen 7"/>
@@ -4136,534 +4680,6 @@
           </a:prstGeom>
         </p:spPr>
       </p:pic>
-      <p:cxnSp>
-        <p:nvCxnSpPr>
-          <p:cNvPr id="56" name="Conector recto 55"/>
-          <p:cNvCxnSpPr>
-            <a:endCxn id="12" idx="3"/>
-          </p:cNvCxnSpPr>
-          <p:nvPr/>
-        </p:nvCxnSpPr>
-        <p:spPr>
-          <a:xfrm flipV="1">
-            <a:off x="9014390" y="1041987"/>
-            <a:ext cx="0" cy="753109"/>
-          </a:xfrm>
-          <a:prstGeom prst="line">
-            <a:avLst/>
-          </a:prstGeom>
-          <a:ln w="25400"/>
-        </p:spPr>
-        <p:style>
-          <a:lnRef idx="1">
-            <a:schemeClr val="accent1"/>
-          </a:lnRef>
-          <a:fillRef idx="0">
-            <a:schemeClr val="accent1"/>
-          </a:fillRef>
-          <a:effectRef idx="0">
-            <a:schemeClr val="accent1"/>
-          </a:effectRef>
-          <a:fontRef idx="minor">
-            <a:schemeClr val="tx1"/>
-          </a:fontRef>
-        </p:style>
-      </p:cxnSp>
-      <p:pic>
-        <p:nvPicPr>
-          <p:cNvPr id="54" name="Imagen 53"/>
-          <p:cNvPicPr>
-            <a:picLocks noChangeAspect="1"/>
-          </p:cNvPicPr>
-          <p:nvPr/>
-        </p:nvPicPr>
-        <p:blipFill>
-          <a:blip r:embed="rId3" cstate="print">
-            <a:extLst>
-              <a:ext uri="{28A0092B-C50C-407E-A947-70E740481C1C}">
-                <a14:useLocalDpi xmlns:a14="http://schemas.microsoft.com/office/drawing/2010/main" val="0"/>
-              </a:ext>
-            </a:extLst>
-          </a:blip>
-          <a:stretch>
-            <a:fillRect/>
-          </a:stretch>
-        </p:blipFill>
-        <p:spPr>
-          <a:xfrm>
-            <a:off x="8668724" y="1477224"/>
-            <a:ext cx="751241" cy="799658"/>
-          </a:xfrm>
-          <a:prstGeom prst="rect">
-            <a:avLst/>
-          </a:prstGeom>
-        </p:spPr>
-      </p:pic>
-      <p:sp>
-        <p:nvSpPr>
-          <p:cNvPr id="28" name="Elipse 27"/>
-          <p:cNvSpPr/>
-          <p:nvPr/>
-        </p:nvSpPr>
-        <p:spPr>
-          <a:xfrm>
-            <a:off x="9951233" y="1297159"/>
-            <a:ext cx="2052949" cy="995871"/>
-          </a:xfrm>
-          <a:prstGeom prst="ellipse">
-            <a:avLst/>
-          </a:prstGeom>
-          <a:solidFill>
-            <a:schemeClr val="bg1"/>
-          </a:solidFill>
-        </p:spPr>
-        <p:style>
-          <a:lnRef idx="3">
-            <a:schemeClr val="lt1"/>
-          </a:lnRef>
-          <a:fillRef idx="1">
-            <a:schemeClr val="accent6"/>
-          </a:fillRef>
-          <a:effectRef idx="1">
-            <a:schemeClr val="accent6"/>
-          </a:effectRef>
-          <a:fontRef idx="minor">
-            <a:schemeClr val="lt1"/>
-          </a:fontRef>
-        </p:style>
-        <p:txBody>
-          <a:bodyPr rtlCol="0" anchor="ctr"/>
-          <a:lstStyle/>
-          <a:p>
-            <a:pPr algn="ctr"/>
-            <a:r>
-              <a:rPr lang="es-AR" dirty="0" smtClean="0">
-                <a:solidFill>
-                  <a:schemeClr val="tx1"/>
-                </a:solidFill>
-              </a:rPr>
-              <a:t>Completar una tarea de otro usuario</a:t>
-            </a:r>
-            <a:endParaRPr lang="es-AR" dirty="0">
-              <a:solidFill>
-                <a:schemeClr val="tx1"/>
-              </a:solidFill>
-            </a:endParaRPr>
-          </a:p>
-        </p:txBody>
-      </p:sp>
-      <p:sp>
-        <p:nvSpPr>
-          <p:cNvPr id="29" name="Elipse 28"/>
-          <p:cNvSpPr/>
-          <p:nvPr/>
-        </p:nvSpPr>
-        <p:spPr>
-          <a:xfrm>
-            <a:off x="4968836" y="2268279"/>
-            <a:ext cx="2052949" cy="995871"/>
-          </a:xfrm>
-          <a:prstGeom prst="ellipse">
-            <a:avLst/>
-          </a:prstGeom>
-          <a:solidFill>
-            <a:schemeClr val="bg1"/>
-          </a:solidFill>
-        </p:spPr>
-        <p:style>
-          <a:lnRef idx="3">
-            <a:schemeClr val="lt1"/>
-          </a:lnRef>
-          <a:fillRef idx="1">
-            <a:schemeClr val="accent6"/>
-          </a:fillRef>
-          <a:effectRef idx="1">
-            <a:schemeClr val="accent6"/>
-          </a:effectRef>
-          <a:fontRef idx="minor">
-            <a:schemeClr val="lt1"/>
-          </a:fontRef>
-        </p:style>
-        <p:txBody>
-          <a:bodyPr rtlCol="0" anchor="ctr"/>
-          <a:lstStyle/>
-          <a:p>
-            <a:pPr algn="ctr"/>
-            <a:r>
-              <a:rPr lang="es-AR" dirty="0" smtClean="0">
-                <a:solidFill>
-                  <a:schemeClr val="tx1"/>
-                </a:solidFill>
-              </a:rPr>
-              <a:t>Cargar archivos a una tarea</a:t>
-            </a:r>
-            <a:endParaRPr lang="es-AR" dirty="0">
-              <a:solidFill>
-                <a:schemeClr val="tx1"/>
-              </a:solidFill>
-            </a:endParaRPr>
-          </a:p>
-        </p:txBody>
-      </p:sp>
-      <p:sp>
-        <p:nvSpPr>
-          <p:cNvPr id="35" name="Elipse 34"/>
-          <p:cNvSpPr/>
-          <p:nvPr/>
-        </p:nvSpPr>
-        <p:spPr>
-          <a:xfrm>
-            <a:off x="5168915" y="3378359"/>
-            <a:ext cx="2052949" cy="995871"/>
-          </a:xfrm>
-          <a:prstGeom prst="ellipse">
-            <a:avLst/>
-          </a:prstGeom>
-          <a:solidFill>
-            <a:schemeClr val="bg1"/>
-          </a:solidFill>
-        </p:spPr>
-        <p:style>
-          <a:lnRef idx="3">
-            <a:schemeClr val="lt1"/>
-          </a:lnRef>
-          <a:fillRef idx="1">
-            <a:schemeClr val="accent6"/>
-          </a:fillRef>
-          <a:effectRef idx="1">
-            <a:schemeClr val="accent6"/>
-          </a:effectRef>
-          <a:fontRef idx="minor">
-            <a:schemeClr val="lt1"/>
-          </a:fontRef>
-        </p:style>
-        <p:txBody>
-          <a:bodyPr rtlCol="0" anchor="ctr"/>
-          <a:lstStyle/>
-          <a:p>
-            <a:pPr algn="ctr"/>
-            <a:r>
-              <a:rPr lang="es-AR" dirty="0" smtClean="0">
-                <a:solidFill>
-                  <a:schemeClr val="tx1"/>
-                </a:solidFill>
-              </a:rPr>
-              <a:t>Cargar archivos a un proyecto</a:t>
-            </a:r>
-            <a:endParaRPr lang="es-AR" dirty="0">
-              <a:solidFill>
-                <a:schemeClr val="tx1"/>
-              </a:solidFill>
-            </a:endParaRPr>
-          </a:p>
-        </p:txBody>
-      </p:sp>
-      <p:sp>
-        <p:nvSpPr>
-          <p:cNvPr id="41" name="Elipse 40"/>
-          <p:cNvSpPr/>
-          <p:nvPr/>
-        </p:nvSpPr>
-        <p:spPr>
-          <a:xfrm>
-            <a:off x="5134546" y="4511877"/>
-            <a:ext cx="2052949" cy="995871"/>
-          </a:xfrm>
-          <a:prstGeom prst="ellipse">
-            <a:avLst/>
-          </a:prstGeom>
-          <a:solidFill>
-            <a:schemeClr val="bg1"/>
-          </a:solidFill>
-        </p:spPr>
-        <p:style>
-          <a:lnRef idx="3">
-            <a:schemeClr val="lt1"/>
-          </a:lnRef>
-          <a:fillRef idx="1">
-            <a:schemeClr val="accent6"/>
-          </a:fillRef>
-          <a:effectRef idx="1">
-            <a:schemeClr val="accent6"/>
-          </a:effectRef>
-          <a:fontRef idx="minor">
-            <a:schemeClr val="lt1"/>
-          </a:fontRef>
-        </p:style>
-        <p:txBody>
-          <a:bodyPr rtlCol="0" anchor="ctr"/>
-          <a:lstStyle/>
-          <a:p>
-            <a:pPr algn="ctr"/>
-            <a:r>
-              <a:rPr lang="es-AR" dirty="0" smtClean="0">
-                <a:solidFill>
-                  <a:schemeClr val="tx1"/>
-                </a:solidFill>
-              </a:rPr>
-              <a:t>Cambiar estado de una tarea</a:t>
-            </a:r>
-            <a:endParaRPr lang="es-AR" dirty="0">
-              <a:solidFill>
-                <a:schemeClr val="tx1"/>
-              </a:solidFill>
-            </a:endParaRPr>
-          </a:p>
-        </p:txBody>
-      </p:sp>
-      <p:sp>
-        <p:nvSpPr>
-          <p:cNvPr id="42" name="Rectángulo 41"/>
-          <p:cNvSpPr/>
-          <p:nvPr/>
-        </p:nvSpPr>
-        <p:spPr>
-          <a:xfrm>
-            <a:off x="2804421" y="3718791"/>
-            <a:ext cx="1802915" cy="684541"/>
-          </a:xfrm>
-          <a:prstGeom prst="rect">
-            <a:avLst/>
-          </a:prstGeom>
-          <a:noFill/>
-        </p:spPr>
-        <p:style>
-          <a:lnRef idx="2">
-            <a:schemeClr val="accent1">
-              <a:shade val="50000"/>
-            </a:schemeClr>
-          </a:lnRef>
-          <a:fillRef idx="1">
-            <a:schemeClr val="accent1"/>
-          </a:fillRef>
-          <a:effectRef idx="0">
-            <a:schemeClr val="accent1"/>
-          </a:effectRef>
-          <a:fontRef idx="minor">
-            <a:schemeClr val="lt1"/>
-          </a:fontRef>
-        </p:style>
-        <p:txBody>
-          <a:bodyPr rtlCol="0" anchor="ctr"/>
-          <a:lstStyle/>
-          <a:p>
-            <a:pPr algn="ctr"/>
-            <a:r>
-              <a:rPr lang="es-AR" dirty="0" smtClean="0">
-                <a:solidFill>
-                  <a:schemeClr val="tx1"/>
-                </a:solidFill>
-              </a:rPr>
-              <a:t>USUARIO</a:t>
-            </a:r>
-          </a:p>
-          <a:p>
-            <a:pPr algn="ctr"/>
-            <a:r>
-              <a:rPr lang="es-AR" dirty="0" smtClean="0">
-                <a:solidFill>
-                  <a:schemeClr val="tx1"/>
-                </a:solidFill>
-              </a:rPr>
-              <a:t>ADMINISTRADOR</a:t>
-            </a:r>
-            <a:endParaRPr lang="es-AR" dirty="0">
-              <a:solidFill>
-                <a:schemeClr val="tx1"/>
-              </a:solidFill>
-            </a:endParaRPr>
-          </a:p>
-        </p:txBody>
-      </p:sp>
-      <p:sp>
-        <p:nvSpPr>
-          <p:cNvPr id="46" name="Elipse 45"/>
-          <p:cNvSpPr/>
-          <p:nvPr/>
-        </p:nvSpPr>
-        <p:spPr>
-          <a:xfrm>
-            <a:off x="6487961" y="263867"/>
-            <a:ext cx="2052949" cy="995871"/>
-          </a:xfrm>
-          <a:prstGeom prst="ellipse">
-            <a:avLst/>
-          </a:prstGeom>
-          <a:solidFill>
-            <a:schemeClr val="accent6"/>
-          </a:solidFill>
-        </p:spPr>
-        <p:style>
-          <a:lnRef idx="3">
-            <a:schemeClr val="lt1"/>
-          </a:lnRef>
-          <a:fillRef idx="1">
-            <a:schemeClr val="accent6"/>
-          </a:fillRef>
-          <a:effectRef idx="1">
-            <a:schemeClr val="accent6"/>
-          </a:effectRef>
-          <a:fontRef idx="minor">
-            <a:schemeClr val="lt1"/>
-          </a:fontRef>
-        </p:style>
-        <p:txBody>
-          <a:bodyPr rtlCol="0" anchor="ctr"/>
-          <a:lstStyle/>
-          <a:p>
-            <a:pPr algn="ctr"/>
-            <a:r>
-              <a:rPr lang="es-AR" dirty="0" smtClean="0">
-                <a:solidFill>
-                  <a:schemeClr val="tx1"/>
-                </a:solidFill>
-              </a:rPr>
-              <a:t>Solicitar carga de dinero</a:t>
-            </a:r>
-            <a:endParaRPr lang="es-AR" dirty="0">
-              <a:solidFill>
-                <a:schemeClr val="tx1"/>
-              </a:solidFill>
-            </a:endParaRPr>
-          </a:p>
-        </p:txBody>
-      </p:sp>
-      <p:sp>
-        <p:nvSpPr>
-          <p:cNvPr id="48" name="Rectángulo 47"/>
-          <p:cNvSpPr/>
-          <p:nvPr/>
-        </p:nvSpPr>
-        <p:spPr>
-          <a:xfrm>
-            <a:off x="7641576" y="6010195"/>
-            <a:ext cx="1889946" cy="331533"/>
-          </a:xfrm>
-          <a:prstGeom prst="rect">
-            <a:avLst/>
-          </a:prstGeom>
-          <a:noFill/>
-        </p:spPr>
-        <p:style>
-          <a:lnRef idx="2">
-            <a:schemeClr val="accent1">
-              <a:shade val="50000"/>
-            </a:schemeClr>
-          </a:lnRef>
-          <a:fillRef idx="1">
-            <a:schemeClr val="accent1"/>
-          </a:fillRef>
-          <a:effectRef idx="0">
-            <a:schemeClr val="accent1"/>
-          </a:effectRef>
-          <a:fontRef idx="minor">
-            <a:schemeClr val="lt1"/>
-          </a:fontRef>
-        </p:style>
-        <p:txBody>
-          <a:bodyPr rtlCol="0" anchor="ctr"/>
-          <a:lstStyle/>
-          <a:p>
-            <a:pPr algn="ctr"/>
-            <a:r>
-              <a:rPr lang="es-AR" dirty="0" smtClean="0">
-                <a:solidFill>
-                  <a:schemeClr val="tx1"/>
-                </a:solidFill>
-              </a:rPr>
-              <a:t>ADMINISTRADOR</a:t>
-            </a:r>
-            <a:endParaRPr lang="es-AR" dirty="0">
-              <a:solidFill>
-                <a:schemeClr val="tx1"/>
-              </a:solidFill>
-            </a:endParaRPr>
-          </a:p>
-        </p:txBody>
-      </p:sp>
-      <p:pic>
-        <p:nvPicPr>
-          <p:cNvPr id="49" name="Imagen 48"/>
-          <p:cNvPicPr>
-            <a:picLocks noChangeAspect="1"/>
-          </p:cNvPicPr>
-          <p:nvPr/>
-        </p:nvPicPr>
-        <p:blipFill>
-          <a:blip r:embed="rId3" cstate="print">
-            <a:extLst>
-              <a:ext uri="{28A0092B-C50C-407E-A947-70E740481C1C}">
-                <a14:useLocalDpi xmlns:a14="http://schemas.microsoft.com/office/drawing/2010/main" val="0"/>
-              </a:ext>
-            </a:extLst>
-          </a:blip>
-          <a:stretch>
-            <a:fillRect/>
-          </a:stretch>
-        </p:blipFill>
-        <p:spPr>
-          <a:xfrm>
-            <a:off x="8235941" y="5117504"/>
-            <a:ext cx="751241" cy="799658"/>
-          </a:xfrm>
-          <a:prstGeom prst="rect">
-            <a:avLst/>
-          </a:prstGeom>
-        </p:spPr>
-      </p:pic>
-      <p:sp>
-        <p:nvSpPr>
-          <p:cNvPr id="50" name="Elipse 49"/>
-          <p:cNvSpPr/>
-          <p:nvPr/>
-        </p:nvSpPr>
-        <p:spPr>
-          <a:xfrm>
-            <a:off x="7641575" y="3445938"/>
-            <a:ext cx="2007812" cy="1135137"/>
-          </a:xfrm>
-          <a:prstGeom prst="ellipse">
-            <a:avLst/>
-          </a:prstGeom>
-          <a:solidFill>
-            <a:schemeClr val="accent6"/>
-          </a:solidFill>
-        </p:spPr>
-        <p:style>
-          <a:lnRef idx="3">
-            <a:schemeClr val="lt1"/>
-          </a:lnRef>
-          <a:fillRef idx="1">
-            <a:schemeClr val="accent6"/>
-          </a:fillRef>
-          <a:effectRef idx="1">
-            <a:schemeClr val="accent6"/>
-          </a:effectRef>
-          <a:fontRef idx="minor">
-            <a:schemeClr val="lt1"/>
-          </a:fontRef>
-        </p:style>
-        <p:txBody>
-          <a:bodyPr rtlCol="0" anchor="ctr"/>
-          <a:lstStyle/>
-          <a:p>
-            <a:pPr algn="ctr"/>
-            <a:r>
-              <a:rPr lang="es-AR" dirty="0" smtClean="0">
-                <a:solidFill>
-                  <a:schemeClr val="tx1"/>
-                </a:solidFill>
-              </a:rPr>
-              <a:t>Aprobar o rechazar un pedido de carga</a:t>
-            </a:r>
-            <a:endParaRPr lang="es-AR" dirty="0">
-              <a:solidFill>
-                <a:schemeClr val="tx1"/>
-              </a:solidFill>
-            </a:endParaRPr>
-          </a:p>
-        </p:txBody>
-      </p:sp>
     </p:spTree>
     <p:extLst>
       <p:ext uri="{BB962C8B-B14F-4D97-AF65-F5344CB8AC3E}">

</xml_diff>